<commit_message>
UML and PowerPoint update
</commit_message>
<xml_diff>
--- a/Project Documents/FinalPresentation.pptx
+++ b/Project Documents/FinalPresentation.pptx
@@ -3148,6 +3148,13 @@
   <p:clrMapOvr>
     <a:masterClrMapping/>
   </p:clrMapOvr>
+  <p:timing>
+    <p:tnLst>
+      <p:par>
+        <p:cTn id="1" dur="indefinite" restart="never" nodeType="tmRoot"/>
+      </p:par>
+    </p:tnLst>
+  </p:timing>
 </p:sld>
 </file>
 
@@ -3239,15 +3246,7 @@
             </a:pPr>
             <a:r>
               <a:rPr lang="en-US" sz="2800" dirty="0" smtClean="0"/>
-              <a:t>Programmed </a:t>
-            </a:r>
-            <a:r>
-              <a:rPr lang="en-US" sz="2800" dirty="0" smtClean="0"/>
-              <a:t> </a:t>
-            </a:r>
-            <a:r>
-              <a:rPr lang="en-US" sz="2800" dirty="0" smtClean="0"/>
-              <a:t>in Java language</a:t>
+              <a:t>Programmed  in Java language</a:t>
             </a:r>
           </a:p>
           <a:p>
@@ -3267,6 +3266,13 @@
   <p:clrMapOvr>
     <a:masterClrMapping/>
   </p:clrMapOvr>
+  <p:timing>
+    <p:tnLst>
+      <p:par>
+        <p:cTn id="1" dur="indefinite" restart="never" nodeType="tmRoot"/>
+      </p:par>
+    </p:tnLst>
+  </p:timing>
 </p:sld>
 </file>
 
@@ -3347,21 +3353,9 @@
           </a:p>
         </p:txBody>
       </p:sp>
-      <p:sp>
-        <p:nvSpPr>
-          <p:cNvPr id="25" name="Picture Placeholder 24"/>
-          <p:cNvSpPr>
-            <a:spLocks noGrp="1"/>
-          </p:cNvSpPr>
-          <p:nvPr>
-            <p:ph type="pic" idx="1"/>
-          </p:nvPr>
-        </p:nvSpPr>
-        <p:spPr/>
-      </p:sp>
       <p:pic>
         <p:nvPicPr>
-          <p:cNvPr id="1027" name="Picture 3" descr="C:\Users\LivingStone\Desktop\Screenshot (79).png"/>
+          <p:cNvPr id="1026" name="Picture 2" descr="C:\Users\LivingStone\Desktop\CharacterUML.png"/>
           <p:cNvPicPr>
             <a:picLocks noChangeAspect="1" noChangeArrowheads="1"/>
           </p:cNvPicPr>
@@ -3376,8 +3370,8 @@
         </p:blipFill>
         <p:spPr bwMode="auto">
           <a:xfrm>
-            <a:off x="304800" y="685800"/>
-            <a:ext cx="8477250" cy="6172200"/>
+            <a:off x="685800" y="762000"/>
+            <a:ext cx="7650162" cy="6096000"/>
           </a:xfrm>
           <a:prstGeom prst="rect">
             <a:avLst/>
@@ -3477,21 +3471,9 @@
           </a:p>
         </p:txBody>
       </p:sp>
-      <p:sp>
-        <p:nvSpPr>
-          <p:cNvPr id="5" name="Picture Placeholder 4"/>
-          <p:cNvSpPr>
-            <a:spLocks noGrp="1"/>
-          </p:cNvSpPr>
-          <p:nvPr>
-            <p:ph type="pic" idx="1"/>
-          </p:nvPr>
-        </p:nvSpPr>
-        <p:spPr/>
-      </p:sp>
       <p:pic>
         <p:nvPicPr>
-          <p:cNvPr id="2051" name="Picture 3" descr="C:\Users\LivingStone\Desktop\Screenshot (77).png"/>
+          <p:cNvPr id="2050" name="Picture 2" descr="C:\Users\LivingStone\Desktop\PartyUML.png"/>
           <p:cNvPicPr>
             <a:picLocks noChangeAspect="1" noChangeArrowheads="1"/>
           </p:cNvPicPr>
@@ -3506,8 +3488,8 @@
         </p:blipFill>
         <p:spPr bwMode="auto">
           <a:xfrm>
-            <a:off x="0" y="762000"/>
-            <a:ext cx="9122773" cy="5638800"/>
+            <a:off x="0" y="761999"/>
+            <a:ext cx="9144000" cy="5818273"/>
           </a:xfrm>
           <a:prstGeom prst="rect">
             <a:avLst/>
@@ -3609,7 +3591,7 @@
       </p:sp>
       <p:pic>
         <p:nvPicPr>
-          <p:cNvPr id="3075" name="Picture 3" descr="C:\Users\LivingStone\Desktop\Screenshot (80).png"/>
+          <p:cNvPr id="3074" name="Picture 2" descr="C:\Users\LivingStone\Desktop\GoodCombatBehaviors.png"/>
           <p:cNvPicPr>
             <a:picLocks noChangeAspect="1" noChangeArrowheads="1"/>
           </p:cNvPicPr>
@@ -3624,8 +3606,8 @@
         </p:blipFill>
         <p:spPr bwMode="auto">
           <a:xfrm>
-            <a:off x="304800" y="1447800"/>
-            <a:ext cx="8562975" cy="2571750"/>
+            <a:off x="0" y="1676399"/>
+            <a:ext cx="9144000" cy="2819919"/>
           </a:xfrm>
           <a:prstGeom prst="rect">
             <a:avLst/>
@@ -3727,7 +3709,7 @@
       </p:sp>
       <p:pic>
         <p:nvPicPr>
-          <p:cNvPr id="4098" name="Picture 2" descr="C:\Users\LivingStone\Desktop\Screenshot (78).png"/>
+          <p:cNvPr id="3" name="Picture 2" descr="C:\Users\LivingStone\Desktop\BadCombatBehaviorUML.png"/>
           <p:cNvPicPr>
             <a:picLocks noChangeAspect="1" noChangeArrowheads="1"/>
           </p:cNvPicPr>
@@ -3742,8 +3724,8 @@
         </p:blipFill>
         <p:spPr bwMode="auto">
           <a:xfrm>
-            <a:off x="304800" y="914400"/>
-            <a:ext cx="8467726" cy="5343525"/>
+            <a:off x="0" y="870520"/>
+            <a:ext cx="9144000" cy="5987480"/>
           </a:xfrm>
           <a:prstGeom prst="rect">
             <a:avLst/>

</xml_diff>

<commit_message>
Added Nathans UML to Power Point
</commit_message>
<xml_diff>
--- a/Project Documents/FinalPresentation.pptx
+++ b/Project Documents/FinalPresentation.pptx
@@ -11,6 +11,10 @@
     <p:sldId id="261" r:id="rId5"/>
     <p:sldId id="259" r:id="rId6"/>
     <p:sldId id="260" r:id="rId7"/>
+    <p:sldId id="262" r:id="rId8"/>
+    <p:sldId id="263" r:id="rId9"/>
+    <p:sldId id="264" r:id="rId10"/>
+    <p:sldId id="265" r:id="rId11"/>
   </p:sldIdLst>
   <p:sldSz cx="9144000" cy="6858000" type="screen4x3"/>
   <p:notesSz cx="6858000" cy="9144000"/>
@@ -224,7 +228,7 @@
             <a:fld id="{1D8BD707-D9CF-40AE-B4C6-C98DA3205C09}" type="datetimeFigureOut">
               <a:rPr lang="en-US" smtClean="0"/>
               <a:pPr/>
-              <a:t>8/12/2014</a:t>
+              <a:t>8/13/2014</a:t>
             </a:fld>
             <a:endParaRPr lang="en-US"/>
           </a:p>
@@ -452,7 +456,7 @@
             <a:fld id="{1D8BD707-D9CF-40AE-B4C6-C98DA3205C09}" type="datetimeFigureOut">
               <a:rPr lang="en-US" smtClean="0"/>
               <a:pPr/>
-              <a:t>8/12/2014</a:t>
+              <a:t>8/13/2014</a:t>
             </a:fld>
             <a:endParaRPr lang="en-US"/>
           </a:p>
@@ -629,7 +633,7 @@
             <a:fld id="{1D8BD707-D9CF-40AE-B4C6-C98DA3205C09}" type="datetimeFigureOut">
               <a:rPr lang="en-US" smtClean="0"/>
               <a:pPr/>
-              <a:t>8/12/2014</a:t>
+              <a:t>8/13/2014</a:t>
             </a:fld>
             <a:endParaRPr lang="en-US"/>
           </a:p>
@@ -796,7 +800,7 @@
             <a:fld id="{1D8BD707-D9CF-40AE-B4C6-C98DA3205C09}" type="datetimeFigureOut">
               <a:rPr lang="en-US" smtClean="0"/>
               <a:pPr/>
-              <a:t>8/12/2014</a:t>
+              <a:t>8/13/2014</a:t>
             </a:fld>
             <a:endParaRPr lang="en-US"/>
           </a:p>
@@ -1042,7 +1046,7 @@
             <a:fld id="{1D8BD707-D9CF-40AE-B4C6-C98DA3205C09}" type="datetimeFigureOut">
               <a:rPr lang="en-US" smtClean="0"/>
               <a:pPr/>
-              <a:t>8/12/2014</a:t>
+              <a:t>8/13/2014</a:t>
             </a:fld>
             <a:endParaRPr lang="en-US"/>
           </a:p>
@@ -1308,7 +1312,7 @@
             <a:fld id="{1D8BD707-D9CF-40AE-B4C6-C98DA3205C09}" type="datetimeFigureOut">
               <a:rPr lang="en-US" smtClean="0"/>
               <a:pPr/>
-              <a:t>8/12/2014</a:t>
+              <a:t>8/13/2014</a:t>
             </a:fld>
             <a:endParaRPr lang="en-US"/>
           </a:p>
@@ -1684,7 +1688,7 @@
             <a:fld id="{1D8BD707-D9CF-40AE-B4C6-C98DA3205C09}" type="datetimeFigureOut">
               <a:rPr lang="en-US" smtClean="0"/>
               <a:pPr/>
-              <a:t>8/12/2014</a:t>
+              <a:t>8/13/2014</a:t>
             </a:fld>
             <a:endParaRPr lang="en-US"/>
           </a:p>
@@ -1799,7 +1803,7 @@
             <a:fld id="{1D8BD707-D9CF-40AE-B4C6-C98DA3205C09}" type="datetimeFigureOut">
               <a:rPr lang="en-US" smtClean="0"/>
               <a:pPr/>
-              <a:t>8/12/2014</a:t>
+              <a:t>8/13/2014</a:t>
             </a:fld>
             <a:endParaRPr lang="en-US"/>
           </a:p>
@@ -1891,7 +1895,7 @@
             <a:fld id="{1D8BD707-D9CF-40AE-B4C6-C98DA3205C09}" type="datetimeFigureOut">
               <a:rPr lang="en-US" smtClean="0"/>
               <a:pPr/>
-              <a:t>8/12/2014</a:t>
+              <a:t>8/13/2014</a:t>
             </a:fld>
             <a:endParaRPr lang="en-US"/>
           </a:p>
@@ -2151,7 +2155,7 @@
             <a:fld id="{1D8BD707-D9CF-40AE-B4C6-C98DA3205C09}" type="datetimeFigureOut">
               <a:rPr lang="en-US" smtClean="0"/>
               <a:pPr/>
-              <a:t>8/12/2014</a:t>
+              <a:t>8/13/2014</a:t>
             </a:fld>
             <a:endParaRPr lang="en-US"/>
           </a:p>
@@ -2417,7 +2421,7 @@
             <a:fld id="{1D8BD707-D9CF-40AE-B4C6-C98DA3205C09}" type="datetimeFigureOut">
               <a:rPr lang="en-US" smtClean="0"/>
               <a:pPr/>
-              <a:t>8/12/2014</a:t>
+              <a:t>8/13/2014</a:t>
             </a:fld>
             <a:endParaRPr lang="en-US"/>
           </a:p>
@@ -2636,7 +2640,7 @@
             <a:fld id="{1D8BD707-D9CF-40AE-B4C6-C98DA3205C09}" type="datetimeFigureOut">
               <a:rPr lang="en-US" smtClean="0"/>
               <a:pPr/>
-              <a:t>8/12/2014</a:t>
+              <a:t>8/13/2014</a:t>
             </a:fld>
             <a:endParaRPr lang="en-US"/>
           </a:p>
@@ -3158,6 +3162,124 @@
 </p:sld>
 </file>
 
+<file path=ppt/slides/slide10.xml><?xml version="1.0" encoding="utf-8"?>
+<p:sld xmlns:a="http://schemas.openxmlformats.org/drawingml/2006/main" xmlns:r="http://schemas.openxmlformats.org/officeDocument/2006/relationships" xmlns:p="http://schemas.openxmlformats.org/presentationml/2006/main">
+  <p:cSld>
+    <p:spTree>
+      <p:nvGrpSpPr>
+        <p:cNvPr id="1" name=""/>
+        <p:cNvGrpSpPr/>
+        <p:nvPr/>
+      </p:nvGrpSpPr>
+      <p:grpSpPr>
+        <a:xfrm>
+          <a:off x="0" y="0"/>
+          <a:ext cx="0" cy="0"/>
+          <a:chOff x="0" y="0"/>
+          <a:chExt cx="0" cy="0"/>
+        </a:xfrm>
+      </p:grpSpPr>
+      <p:sp>
+        <p:nvSpPr>
+          <p:cNvPr id="2" name="Title 1"/>
+          <p:cNvSpPr>
+            <a:spLocks noGrp="1"/>
+          </p:cNvSpPr>
+          <p:nvPr>
+            <p:ph type="title"/>
+          </p:nvPr>
+        </p:nvSpPr>
+        <p:spPr>
+          <a:xfrm>
+            <a:off x="1828800" y="0"/>
+            <a:ext cx="5486400" cy="293688"/>
+          </a:xfrm>
+        </p:spPr>
+        <p:txBody>
+          <a:bodyPr>
+            <a:normAutofit fontScale="90000"/>
+          </a:bodyPr>
+          <a:lstStyle/>
+          <a:p>
+            <a:r>
+              <a:rPr lang="en-US" dirty="0" smtClean="0"/>
+              <a:t>UML Diagrams</a:t>
+            </a:r>
+            <a:endParaRPr lang="en-US" dirty="0"/>
+          </a:p>
+        </p:txBody>
+      </p:sp>
+      <p:sp>
+        <p:nvSpPr>
+          <p:cNvPr id="4" name="Text Placeholder 3"/>
+          <p:cNvSpPr>
+            <a:spLocks noGrp="1"/>
+          </p:cNvSpPr>
+          <p:nvPr>
+            <p:ph type="body" sz="half" idx="2"/>
+          </p:nvPr>
+        </p:nvSpPr>
+        <p:spPr>
+          <a:xfrm>
+            <a:off x="1828800" y="381000"/>
+            <a:ext cx="5486400" cy="377952"/>
+          </a:xfrm>
+        </p:spPr>
+        <p:txBody>
+          <a:bodyPr>
+            <a:normAutofit lnSpcReduction="10000"/>
+          </a:bodyPr>
+          <a:lstStyle/>
+          <a:p>
+            <a:r>
+              <a:rPr lang="en-US" sz="2000" dirty="0" smtClean="0"/>
+              <a:t>Main</a:t>
+            </a:r>
+            <a:endParaRPr lang="en-US" sz="2000" dirty="0"/>
+          </a:p>
+        </p:txBody>
+      </p:sp>
+      <p:pic>
+        <p:nvPicPr>
+          <p:cNvPr id="4099" name="Picture 3" descr="C:\Users\LivingStone\Desktop\Main.png"/>
+          <p:cNvPicPr>
+            <a:picLocks noChangeAspect="1" noChangeArrowheads="1"/>
+          </p:cNvPicPr>
+          <p:nvPr/>
+        </p:nvPicPr>
+        <p:blipFill>
+          <a:blip r:embed="rId2" cstate="print"/>
+          <a:srcRect/>
+          <a:stretch>
+            <a:fillRect/>
+          </a:stretch>
+        </p:blipFill>
+        <p:spPr bwMode="auto">
+          <a:xfrm>
+            <a:off x="457200" y="639255"/>
+            <a:ext cx="8305799" cy="6218745"/>
+          </a:xfrm>
+          <a:prstGeom prst="rect">
+            <a:avLst/>
+          </a:prstGeom>
+          <a:noFill/>
+        </p:spPr>
+      </p:pic>
+    </p:spTree>
+  </p:cSld>
+  <p:clrMapOvr>
+    <a:masterClrMapping/>
+  </p:clrMapOvr>
+  <p:timing>
+    <p:tnLst>
+      <p:par>
+        <p:cTn id="1" dur="indefinite" restart="never" nodeType="tmRoot"/>
+      </p:par>
+    </p:tnLst>
+  </p:timing>
+</p:sld>
+</file>
+
 <file path=ppt/slides/slide2.xml><?xml version="1.0" encoding="utf-8"?>
 <p:sld xmlns:a="http://schemas.openxmlformats.org/drawingml/2006/main" xmlns:r="http://schemas.openxmlformats.org/officeDocument/2006/relationships" xmlns:p="http://schemas.openxmlformats.org/presentationml/2006/main">
   <p:cSld>
@@ -3726,6 +3848,360 @@
           <a:xfrm>
             <a:off x="0" y="870520"/>
             <a:ext cx="9144000" cy="5987480"/>
+          </a:xfrm>
+          <a:prstGeom prst="rect">
+            <a:avLst/>
+          </a:prstGeom>
+          <a:noFill/>
+        </p:spPr>
+      </p:pic>
+    </p:spTree>
+  </p:cSld>
+  <p:clrMapOvr>
+    <a:masterClrMapping/>
+  </p:clrMapOvr>
+  <p:timing>
+    <p:tnLst>
+      <p:par>
+        <p:cTn id="1" dur="indefinite" restart="never" nodeType="tmRoot"/>
+      </p:par>
+    </p:tnLst>
+  </p:timing>
+</p:sld>
+</file>
+
+<file path=ppt/slides/slide7.xml><?xml version="1.0" encoding="utf-8"?>
+<p:sld xmlns:a="http://schemas.openxmlformats.org/drawingml/2006/main" xmlns:r="http://schemas.openxmlformats.org/officeDocument/2006/relationships" xmlns:p="http://schemas.openxmlformats.org/presentationml/2006/main">
+  <p:cSld>
+    <p:spTree>
+      <p:nvGrpSpPr>
+        <p:cNvPr id="1" name=""/>
+        <p:cNvGrpSpPr/>
+        <p:nvPr/>
+      </p:nvGrpSpPr>
+      <p:grpSpPr>
+        <a:xfrm>
+          <a:off x="0" y="0"/>
+          <a:ext cx="0" cy="0"/>
+          <a:chOff x="0" y="0"/>
+          <a:chExt cx="0" cy="0"/>
+        </a:xfrm>
+      </p:grpSpPr>
+      <p:sp>
+        <p:nvSpPr>
+          <p:cNvPr id="2" name="Title 1"/>
+          <p:cNvSpPr>
+            <a:spLocks noGrp="1"/>
+          </p:cNvSpPr>
+          <p:nvPr>
+            <p:ph type="title"/>
+          </p:nvPr>
+        </p:nvSpPr>
+        <p:spPr>
+          <a:xfrm>
+            <a:off x="1828800" y="0"/>
+            <a:ext cx="5486400" cy="293688"/>
+          </a:xfrm>
+        </p:spPr>
+        <p:txBody>
+          <a:bodyPr>
+            <a:normAutofit fontScale="90000"/>
+          </a:bodyPr>
+          <a:lstStyle/>
+          <a:p>
+            <a:r>
+              <a:rPr lang="en-US" dirty="0" smtClean="0"/>
+              <a:t>UML Diagrams</a:t>
+            </a:r>
+            <a:endParaRPr lang="en-US" dirty="0"/>
+          </a:p>
+        </p:txBody>
+      </p:sp>
+      <p:sp>
+        <p:nvSpPr>
+          <p:cNvPr id="4" name="Text Placeholder 3"/>
+          <p:cNvSpPr>
+            <a:spLocks noGrp="1"/>
+          </p:cNvSpPr>
+          <p:nvPr>
+            <p:ph type="body" sz="half" idx="2"/>
+          </p:nvPr>
+        </p:nvSpPr>
+        <p:spPr>
+          <a:xfrm>
+            <a:off x="1828800" y="381000"/>
+            <a:ext cx="5486400" cy="377952"/>
+          </a:xfrm>
+        </p:spPr>
+        <p:txBody>
+          <a:bodyPr>
+            <a:normAutofit lnSpcReduction="10000"/>
+          </a:bodyPr>
+          <a:lstStyle/>
+          <a:p>
+            <a:r>
+              <a:rPr lang="en-US" sz="2000" dirty="0" smtClean="0"/>
+              <a:t>Combat System</a:t>
+            </a:r>
+            <a:endParaRPr lang="en-US" sz="2000" dirty="0"/>
+          </a:p>
+        </p:txBody>
+      </p:sp>
+      <p:pic>
+        <p:nvPicPr>
+          <p:cNvPr id="1027" name="Picture 3" descr="C:\Users\LivingStone\Desktop\CombatUML.png"/>
+          <p:cNvPicPr>
+            <a:picLocks noChangeAspect="1" noChangeArrowheads="1"/>
+          </p:cNvPicPr>
+          <p:nvPr/>
+        </p:nvPicPr>
+        <p:blipFill>
+          <a:blip r:embed="rId2" cstate="print"/>
+          <a:srcRect/>
+          <a:stretch>
+            <a:fillRect/>
+          </a:stretch>
+        </p:blipFill>
+        <p:spPr bwMode="auto">
+          <a:xfrm>
+            <a:off x="2438400" y="742610"/>
+            <a:ext cx="4038600" cy="6115390"/>
+          </a:xfrm>
+          <a:prstGeom prst="rect">
+            <a:avLst/>
+          </a:prstGeom>
+          <a:noFill/>
+        </p:spPr>
+      </p:pic>
+    </p:spTree>
+  </p:cSld>
+  <p:clrMapOvr>
+    <a:masterClrMapping/>
+  </p:clrMapOvr>
+  <p:timing>
+    <p:tnLst>
+      <p:par>
+        <p:cTn id="1" dur="indefinite" restart="never" nodeType="tmRoot"/>
+      </p:par>
+    </p:tnLst>
+  </p:timing>
+</p:sld>
+</file>
+
+<file path=ppt/slides/slide8.xml><?xml version="1.0" encoding="utf-8"?>
+<p:sld xmlns:a="http://schemas.openxmlformats.org/drawingml/2006/main" xmlns:r="http://schemas.openxmlformats.org/officeDocument/2006/relationships" xmlns:p="http://schemas.openxmlformats.org/presentationml/2006/main">
+  <p:cSld>
+    <p:spTree>
+      <p:nvGrpSpPr>
+        <p:cNvPr id="1" name=""/>
+        <p:cNvGrpSpPr/>
+        <p:nvPr/>
+      </p:nvGrpSpPr>
+      <p:grpSpPr>
+        <a:xfrm>
+          <a:off x="0" y="0"/>
+          <a:ext cx="0" cy="0"/>
+          <a:chOff x="0" y="0"/>
+          <a:chExt cx="0" cy="0"/>
+        </a:xfrm>
+      </p:grpSpPr>
+      <p:sp>
+        <p:nvSpPr>
+          <p:cNvPr id="2" name="Title 1"/>
+          <p:cNvSpPr>
+            <a:spLocks noGrp="1"/>
+          </p:cNvSpPr>
+          <p:nvPr>
+            <p:ph type="title"/>
+          </p:nvPr>
+        </p:nvSpPr>
+        <p:spPr>
+          <a:xfrm>
+            <a:off x="1828800" y="0"/>
+            <a:ext cx="5486400" cy="293688"/>
+          </a:xfrm>
+        </p:spPr>
+        <p:txBody>
+          <a:bodyPr>
+            <a:normAutofit fontScale="90000"/>
+          </a:bodyPr>
+          <a:lstStyle/>
+          <a:p>
+            <a:r>
+              <a:rPr lang="en-US" dirty="0" smtClean="0"/>
+              <a:t>UML Diagrams</a:t>
+            </a:r>
+            <a:endParaRPr lang="en-US" dirty="0"/>
+          </a:p>
+        </p:txBody>
+      </p:sp>
+      <p:sp>
+        <p:nvSpPr>
+          <p:cNvPr id="4" name="Text Placeholder 3"/>
+          <p:cNvSpPr>
+            <a:spLocks noGrp="1"/>
+          </p:cNvSpPr>
+          <p:nvPr>
+            <p:ph type="body" sz="half" idx="2"/>
+          </p:nvPr>
+        </p:nvSpPr>
+        <p:spPr>
+          <a:xfrm>
+            <a:off x="1828800" y="381000"/>
+            <a:ext cx="5486400" cy="377952"/>
+          </a:xfrm>
+        </p:spPr>
+        <p:txBody>
+          <a:bodyPr>
+            <a:normAutofit lnSpcReduction="10000"/>
+          </a:bodyPr>
+          <a:lstStyle/>
+          <a:p>
+            <a:r>
+              <a:rPr lang="en-US" sz="2000" dirty="0" smtClean="0"/>
+              <a:t>Dungeon Builder</a:t>
+            </a:r>
+            <a:endParaRPr lang="en-US" sz="2000" dirty="0"/>
+          </a:p>
+        </p:txBody>
+      </p:sp>
+      <p:pic>
+        <p:nvPicPr>
+          <p:cNvPr id="2050" name="Picture 2" descr="C:\Users\LivingStone\Desktop\DungeonBuilderUML.png"/>
+          <p:cNvPicPr>
+            <a:picLocks noChangeAspect="1" noChangeArrowheads="1"/>
+          </p:cNvPicPr>
+          <p:nvPr/>
+        </p:nvPicPr>
+        <p:blipFill>
+          <a:blip r:embed="rId2" cstate="print"/>
+          <a:srcRect/>
+          <a:stretch>
+            <a:fillRect/>
+          </a:stretch>
+        </p:blipFill>
+        <p:spPr bwMode="auto">
+          <a:xfrm>
+            <a:off x="838200" y="809259"/>
+            <a:ext cx="7391400" cy="6048741"/>
+          </a:xfrm>
+          <a:prstGeom prst="rect">
+            <a:avLst/>
+          </a:prstGeom>
+          <a:noFill/>
+        </p:spPr>
+      </p:pic>
+    </p:spTree>
+  </p:cSld>
+  <p:clrMapOvr>
+    <a:masterClrMapping/>
+  </p:clrMapOvr>
+  <p:timing>
+    <p:tnLst>
+      <p:par>
+        <p:cTn id="1" dur="indefinite" restart="never" nodeType="tmRoot"/>
+      </p:par>
+    </p:tnLst>
+  </p:timing>
+</p:sld>
+</file>
+
+<file path=ppt/slides/slide9.xml><?xml version="1.0" encoding="utf-8"?>
+<p:sld xmlns:a="http://schemas.openxmlformats.org/drawingml/2006/main" xmlns:r="http://schemas.openxmlformats.org/officeDocument/2006/relationships" xmlns:p="http://schemas.openxmlformats.org/presentationml/2006/main">
+  <p:cSld>
+    <p:spTree>
+      <p:nvGrpSpPr>
+        <p:cNvPr id="1" name=""/>
+        <p:cNvGrpSpPr/>
+        <p:nvPr/>
+      </p:nvGrpSpPr>
+      <p:grpSpPr>
+        <a:xfrm>
+          <a:off x="0" y="0"/>
+          <a:ext cx="0" cy="0"/>
+          <a:chOff x="0" y="0"/>
+          <a:chExt cx="0" cy="0"/>
+        </a:xfrm>
+      </p:grpSpPr>
+      <p:sp>
+        <p:nvSpPr>
+          <p:cNvPr id="2" name="Title 1"/>
+          <p:cNvSpPr>
+            <a:spLocks noGrp="1"/>
+          </p:cNvSpPr>
+          <p:nvPr>
+            <p:ph type="title"/>
+          </p:nvPr>
+        </p:nvSpPr>
+        <p:spPr>
+          <a:xfrm>
+            <a:off x="1828800" y="0"/>
+            <a:ext cx="5486400" cy="293688"/>
+          </a:xfrm>
+        </p:spPr>
+        <p:txBody>
+          <a:bodyPr>
+            <a:normAutofit fontScale="90000"/>
+          </a:bodyPr>
+          <a:lstStyle/>
+          <a:p>
+            <a:r>
+              <a:rPr lang="en-US" dirty="0" smtClean="0"/>
+              <a:t>UML Diagrams</a:t>
+            </a:r>
+            <a:endParaRPr lang="en-US" dirty="0"/>
+          </a:p>
+        </p:txBody>
+      </p:sp>
+      <p:sp>
+        <p:nvSpPr>
+          <p:cNvPr id="4" name="Text Placeholder 3"/>
+          <p:cNvSpPr>
+            <a:spLocks noGrp="1"/>
+          </p:cNvSpPr>
+          <p:nvPr>
+            <p:ph type="body" sz="half" idx="2"/>
+          </p:nvPr>
+        </p:nvSpPr>
+        <p:spPr>
+          <a:xfrm>
+            <a:off x="1828800" y="381000"/>
+            <a:ext cx="5486400" cy="377952"/>
+          </a:xfrm>
+        </p:spPr>
+        <p:txBody>
+          <a:bodyPr>
+            <a:normAutofit lnSpcReduction="10000"/>
+          </a:bodyPr>
+          <a:lstStyle/>
+          <a:p>
+            <a:r>
+              <a:rPr lang="en-US" sz="2000" dirty="0" smtClean="0"/>
+              <a:t>Dungeon Structure</a:t>
+            </a:r>
+            <a:endParaRPr lang="en-US" sz="2000" dirty="0"/>
+          </a:p>
+        </p:txBody>
+      </p:sp>
+      <p:pic>
+        <p:nvPicPr>
+          <p:cNvPr id="3074" name="Picture 2" descr="C:\Users\LivingStone\Desktop\DungeonUML.png"/>
+          <p:cNvPicPr>
+            <a:picLocks noChangeAspect="1" noChangeArrowheads="1"/>
+          </p:cNvPicPr>
+          <p:nvPr/>
+        </p:nvPicPr>
+        <p:blipFill>
+          <a:blip r:embed="rId2" cstate="print"/>
+          <a:srcRect/>
+          <a:stretch>
+            <a:fillRect/>
+          </a:stretch>
+        </p:blipFill>
+        <p:spPr bwMode="auto">
+          <a:xfrm>
+            <a:off x="914400" y="724116"/>
+            <a:ext cx="7391400" cy="6133884"/>
           </a:xfrm>
           <a:prstGeom prst="rect">
             <a:avLst/>

</xml_diff>